<commit_message>
update gantt chart, without all tasks, with longer period
</commit_message>
<xml_diff>
--- a/docs/Proof of concept presentation.pptx
+++ b/docs/Proof of concept presentation.pptx
@@ -174,9 +174,9 @@
           <c:invertIfNegative val="0"/>
           <c:cat>
             <c:strRef>
-              <c:f>Sheet1!$A$2:$A$18</c:f>
+              <c:f>Sheet1!$A$2:$A$10</c:f>
               <c:strCache>
-                <c:ptCount val="17"/>
+                <c:ptCount val="9"/>
                 <c:pt idx="0">
                   <c:v>Meta-question management</c:v>
                 </c:pt>
@@ -196,97 +196,49 @@
                   <c:v>Appendices management (appendices + thir meta questions)</c:v>
                 </c:pt>
                 <c:pt idx="6">
-                  <c:v>Stem management (stems + their appendices + their meta questions) </c:v>
+                  <c:v>Question production</c:v>
                 </c:pt>
                 <c:pt idx="7">
-                  <c:v>Maintain history (continue where left off)</c:v>
+                  <c:v>Selection of meta-questions by keywords/substring</c:v>
                 </c:pt>
                 <c:pt idx="8">
-                  <c:v>Question production</c:v>
-                </c:pt>
-                <c:pt idx="9">
-                  <c:v>Exam production</c:v>
-                </c:pt>
-                <c:pt idx="10">
-                  <c:v>Catalog production</c:v>
-                </c:pt>
-                <c:pt idx="11">
                   <c:v>Version Control</c:v>
-                </c:pt>
-                <c:pt idx="12">
-                  <c:v>Ask for work</c:v>
-                </c:pt>
-                <c:pt idx="13">
-                  <c:v>Selection of meta-questions by keywords/substring</c:v>
-                </c:pt>
-                <c:pt idx="14">
-                  <c:v>Version Control</c:v>
-                </c:pt>
-                <c:pt idx="15">
-                  <c:v>Manual urgency control</c:v>
-                </c:pt>
-                <c:pt idx="16">
-                  <c:v>Automatic/Algorithmic urgency control</c:v>
                 </c:pt>
               </c:strCache>
             </c:strRef>
           </c:cat>
           <c:val>
             <c:numRef>
-              <c:f>Sheet1!$B$2:$B$18</c:f>
+              <c:f>Sheet1!$B$2:$B$10</c:f>
               <c:numCache>
                 <c:formatCode>m/d;@</c:formatCode>
-                <c:ptCount val="17"/>
+                <c:ptCount val="9"/>
                 <c:pt idx="0">
                   <c:v>45328</c:v>
                 </c:pt>
                 <c:pt idx="1">
-                  <c:v>45335</c:v>
+                  <c:v>45338</c:v>
                 </c:pt>
                 <c:pt idx="2">
-                  <c:v>45339</c:v>
+                  <c:v>45343</c:v>
                 </c:pt>
                 <c:pt idx="3">
-                  <c:v>45343</c:v>
+                  <c:v>45353</c:v>
                 </c:pt>
                 <c:pt idx="4">
-                  <c:v>45347</c:v>
+                  <c:v>45367</c:v>
                 </c:pt>
                 <c:pt idx="5">
-                  <c:v>45352</c:v>
+                  <c:v>45377</c:v>
                 </c:pt>
                 <c:pt idx="6">
-                  <c:v>45357</c:v>
+                  <c:v>45384</c:v>
                 </c:pt>
                 <c:pt idx="7">
-                  <c:v>45362</c:v>
+                  <c:v>45391</c:v>
                 </c:pt>
                 <c:pt idx="8">
-                  <c:v>45365</c:v>
-                </c:pt>
-                <c:pt idx="9">
-                  <c:v>45370</c:v>
-                </c:pt>
-                <c:pt idx="10">
-                  <c:v>45373</c:v>
-                </c:pt>
-                <c:pt idx="11">
-                  <c:v>45376</c:v>
-                </c:pt>
-                <c:pt idx="12">
-                  <c:v>45379</c:v>
-                </c:pt>
-                <c:pt idx="13">
-                  <c:v>45384</c:v>
-                </c:pt>
-                <c:pt idx="14">
-                  <c:v>45386</c:v>
-                </c:pt>
-                <c:pt idx="15">
-                  <c:v>45390</c:v>
-                </c:pt>
-                <c:pt idx="16">
-                  <c:v>45397</c:v>
+                  <c:v>45394</c:v>
                 </c:pt>
               </c:numCache>
             </c:numRef>
@@ -380,9 +332,9 @@
           </c:dLbls>
           <c:cat>
             <c:strRef>
-              <c:f>Sheet1!$A$2:$A$18</c:f>
+              <c:f>Sheet1!$A$2:$A$10</c:f>
               <c:strCache>
-                <c:ptCount val="17"/>
+                <c:ptCount val="9"/>
                 <c:pt idx="0">
                   <c:v>Meta-question management</c:v>
                 </c:pt>
@@ -402,97 +354,49 @@
                   <c:v>Appendices management (appendices + thir meta questions)</c:v>
                 </c:pt>
                 <c:pt idx="6">
-                  <c:v>Stem management (stems + their appendices + their meta questions) </c:v>
+                  <c:v>Question production</c:v>
                 </c:pt>
                 <c:pt idx="7">
-                  <c:v>Maintain history (continue where left off)</c:v>
+                  <c:v>Selection of meta-questions by keywords/substring</c:v>
                 </c:pt>
                 <c:pt idx="8">
-                  <c:v>Question production</c:v>
-                </c:pt>
-                <c:pt idx="9">
-                  <c:v>Exam production</c:v>
-                </c:pt>
-                <c:pt idx="10">
-                  <c:v>Catalog production</c:v>
-                </c:pt>
-                <c:pt idx="11">
                   <c:v>Version Control</c:v>
-                </c:pt>
-                <c:pt idx="12">
-                  <c:v>Ask for work</c:v>
-                </c:pt>
-                <c:pt idx="13">
-                  <c:v>Selection of meta-questions by keywords/substring</c:v>
-                </c:pt>
-                <c:pt idx="14">
-                  <c:v>Version Control</c:v>
-                </c:pt>
-                <c:pt idx="15">
-                  <c:v>Manual urgency control</c:v>
-                </c:pt>
-                <c:pt idx="16">
-                  <c:v>Automatic/Algorithmic urgency control</c:v>
                 </c:pt>
               </c:strCache>
             </c:strRef>
           </c:cat>
           <c:val>
             <c:numRef>
-              <c:f>Sheet1!$D$2:$D$18</c:f>
+              <c:f>Sheet1!$D$2:$D$10</c:f>
               <c:numCache>
                 <c:formatCode>General</c:formatCode>
-                <c:ptCount val="17"/>
+                <c:ptCount val="9"/>
                 <c:pt idx="0">
+                  <c:v>10</c:v>
+                </c:pt>
+                <c:pt idx="1">
+                  <c:v>5</c:v>
+                </c:pt>
+                <c:pt idx="2">
+                  <c:v>10</c:v>
+                </c:pt>
+                <c:pt idx="3">
+                  <c:v>14</c:v>
+                </c:pt>
+                <c:pt idx="4">
+                  <c:v>10</c:v>
+                </c:pt>
+                <c:pt idx="5">
                   <c:v>7</c:v>
                 </c:pt>
-                <c:pt idx="1">
-                  <c:v>4</c:v>
-                </c:pt>
-                <c:pt idx="2">
-                  <c:v>4</c:v>
-                </c:pt>
-                <c:pt idx="3">
-                  <c:v>4</c:v>
-                </c:pt>
-                <c:pt idx="4">
-                  <c:v>5</c:v>
-                </c:pt>
-                <c:pt idx="5">
-                  <c:v>5</c:v>
-                </c:pt>
                 <c:pt idx="6">
-                  <c:v>5</c:v>
+                  <c:v>7</c:v>
                 </c:pt>
                 <c:pt idx="7">
                   <c:v>3</c:v>
                 </c:pt>
                 <c:pt idx="8">
                   <c:v>5</c:v>
-                </c:pt>
-                <c:pt idx="9">
-                  <c:v>3</c:v>
-                </c:pt>
-                <c:pt idx="10">
-                  <c:v>3</c:v>
-                </c:pt>
-                <c:pt idx="11">
-                  <c:v>3</c:v>
-                </c:pt>
-                <c:pt idx="12">
-                  <c:v>5</c:v>
-                </c:pt>
-                <c:pt idx="13">
-                  <c:v>2</c:v>
-                </c:pt>
-                <c:pt idx="14">
-                  <c:v>4</c:v>
-                </c:pt>
-                <c:pt idx="15">
-                  <c:v>7</c:v>
-                </c:pt>
-                <c:pt idx="16">
-                  <c:v>7</c:v>
                 </c:pt>
               </c:numCache>
             </c:numRef>
@@ -553,12 +457,12 @@
                     <c:extLst>
                       <c:ext uri="{02D57815-91ED-43cb-92C2-25804820EDAC}">
                         <c15:formulaRef>
-                          <c15:sqref>Sheet1!$A$2:$A$18</c15:sqref>
+                          <c15:sqref>Sheet1!$A$2:$A$10</c15:sqref>
                         </c15:formulaRef>
                       </c:ext>
                     </c:extLst>
                     <c:strCache>
-                      <c:ptCount val="17"/>
+                      <c:ptCount val="9"/>
                       <c:pt idx="0">
                         <c:v>Meta-question management</c:v>
                       </c:pt>
@@ -578,37 +482,13 @@
                         <c:v>Appendices management (appendices + thir meta questions)</c:v>
                       </c:pt>
                       <c:pt idx="6">
-                        <c:v>Stem management (stems + their appendices + their meta questions) </c:v>
+                        <c:v>Question production</c:v>
                       </c:pt>
                       <c:pt idx="7">
-                        <c:v>Maintain history (continue where left off)</c:v>
+                        <c:v>Selection of meta-questions by keywords/substring</c:v>
                       </c:pt>
                       <c:pt idx="8">
-                        <c:v>Question production</c:v>
-                      </c:pt>
-                      <c:pt idx="9">
-                        <c:v>Exam production</c:v>
-                      </c:pt>
-                      <c:pt idx="10">
-                        <c:v>Catalog production</c:v>
-                      </c:pt>
-                      <c:pt idx="11">
                         <c:v>Version Control</c:v>
-                      </c:pt>
-                      <c:pt idx="12">
-                        <c:v>Ask for work</c:v>
-                      </c:pt>
-                      <c:pt idx="13">
-                        <c:v>Selection of meta-questions by keywords/substring</c:v>
-                      </c:pt>
-                      <c:pt idx="14">
-                        <c:v>Version Control</c:v>
-                      </c:pt>
-                      <c:pt idx="15">
-                        <c:v>Manual urgency control</c:v>
-                      </c:pt>
-                      <c:pt idx="16">
-                        <c:v>Automatic/Algorithmic urgency control</c:v>
                       </c:pt>
                     </c:strCache>
                   </c:strRef>
@@ -618,63 +498,39 @@
                     <c:extLst>
                       <c:ext uri="{02D57815-91ED-43cb-92C2-25804820EDAC}">
                         <c15:formulaRef>
-                          <c15:sqref>Sheet1!$C$2:$C$18</c15:sqref>
+                          <c15:sqref>Sheet1!$C$2:$C$10</c15:sqref>
                         </c15:formulaRef>
                       </c:ext>
                     </c:extLst>
                     <c:numCache>
                       <c:formatCode>m/d;@</c:formatCode>
-                      <c:ptCount val="17"/>
+                      <c:ptCount val="9"/>
                       <c:pt idx="0">
-                        <c:v>45335</c:v>
+                        <c:v>45338</c:v>
                       </c:pt>
                       <c:pt idx="1">
-                        <c:v>45339</c:v>
+                        <c:v>45343</c:v>
                       </c:pt>
                       <c:pt idx="2">
-                        <c:v>45343</c:v>
+                        <c:v>45353</c:v>
                       </c:pt>
                       <c:pt idx="3">
-                        <c:v>45347</c:v>
+                        <c:v>45367</c:v>
                       </c:pt>
                       <c:pt idx="4">
-                        <c:v>45352</c:v>
+                        <c:v>45377</c:v>
                       </c:pt>
                       <c:pt idx="5">
-                        <c:v>45357</c:v>
+                        <c:v>45384</c:v>
                       </c:pt>
                       <c:pt idx="6">
-                        <c:v>45362</c:v>
+                        <c:v>45391</c:v>
                       </c:pt>
                       <c:pt idx="7">
-                        <c:v>45365</c:v>
+                        <c:v>45394</c:v>
                       </c:pt>
                       <c:pt idx="8">
-                        <c:v>45370</c:v>
-                      </c:pt>
-                      <c:pt idx="9">
-                        <c:v>45373</c:v>
-                      </c:pt>
-                      <c:pt idx="10">
-                        <c:v>45376</c:v>
-                      </c:pt>
-                      <c:pt idx="11">
-                        <c:v>45379</c:v>
-                      </c:pt>
-                      <c:pt idx="12">
-                        <c:v>45384</c:v>
-                      </c:pt>
-                      <c:pt idx="13">
-                        <c:v>45386</c:v>
-                      </c:pt>
-                      <c:pt idx="14">
-                        <c:v>45390</c:v>
-                      </c:pt>
-                      <c:pt idx="15">
-                        <c:v>45397</c:v>
-                      </c:pt>
-                      <c:pt idx="16">
-                        <c:v>45404</c:v>
+                        <c:v>45399</c:v>
                       </c:pt>
                     </c:numCache>
                   </c:numRef>
@@ -17194,7 +17050,7 @@
           <p:nvPr>
             <p:extLst>
               <p:ext uri="{D42A27DB-BD31-4B8C-83A1-F6EECF244321}">
-                <p14:modId xmlns:p14="http://schemas.microsoft.com/office/powerpoint/2010/main" val="563054789"/>
+                <p14:modId xmlns:p14="http://schemas.microsoft.com/office/powerpoint/2010/main" val="2596823437"/>
               </p:ext>
             </p:extLst>
           </p:nvPr>
@@ -28724,7 +28580,7 @@
         <p:spPr>
           <a:xfrm>
             <a:off x="8713237" y="1800612"/>
-            <a:ext cx="2412330" cy="307777"/>
+            <a:ext cx="2412330" cy="646331"/>
           </a:xfrm>
           <a:prstGeom prst="rect">
             <a:avLst/>
@@ -28739,7 +28595,19 @@
           <a:p>
             <a:r>
               <a:rPr lang="en-US" dirty="0"/>
-              <a:t>Workflow management</a:t>
+              <a:t>W</a:t>
+            </a:r>
+            <a:r>
+              <a:rPr lang="he-IL" dirty="0"/>
+              <a:t>	</a:t>
+            </a:r>
+            <a:r>
+              <a:rPr lang="en-US" dirty="0" err="1"/>
+              <a:t>orkflow</a:t>
+            </a:r>
+            <a:r>
+              <a:rPr lang="en-US" dirty="0"/>
+              <a:t> management</a:t>
             </a:r>
             <a:endParaRPr lang="en-IL" dirty="0"/>
           </a:p>

</xml_diff>